<commit_message>
Auto push 2023-06-20 16:56:54.43
</commit_message>
<xml_diff>
--- a/동그라미소프트/화면정의서_실습용2.pptx
+++ b/동그라미소프트/화면정의서_실습용2.pptx
@@ -243,7 +243,7 @@
           <a:p>
             <a:fld id="{8C1837D2-6ADD-45AA-8DF7-A2610B22EAD7}" type="datetimeFigureOut">
               <a:rPr lang="ko-KR" altLang="en-US" smtClean="0"/>
-              <a:t>2023-06-19</a:t>
+              <a:t>2023-06-20</a:t>
             </a:fld>
             <a:endParaRPr lang="ko-KR" altLang="en-US"/>
           </a:p>
@@ -413,7 +413,7 @@
           <a:p>
             <a:fld id="{8C1837D2-6ADD-45AA-8DF7-A2610B22EAD7}" type="datetimeFigureOut">
               <a:rPr lang="ko-KR" altLang="en-US" smtClean="0"/>
-              <a:t>2023-06-19</a:t>
+              <a:t>2023-06-20</a:t>
             </a:fld>
             <a:endParaRPr lang="ko-KR" altLang="en-US"/>
           </a:p>
@@ -593,7 +593,7 @@
           <a:p>
             <a:fld id="{8C1837D2-6ADD-45AA-8DF7-A2610B22EAD7}" type="datetimeFigureOut">
               <a:rPr lang="ko-KR" altLang="en-US" smtClean="0"/>
-              <a:t>2023-06-19</a:t>
+              <a:t>2023-06-20</a:t>
             </a:fld>
             <a:endParaRPr lang="ko-KR" altLang="en-US"/>
           </a:p>
@@ -763,7 +763,7 @@
           <a:p>
             <a:fld id="{8C1837D2-6ADD-45AA-8DF7-A2610B22EAD7}" type="datetimeFigureOut">
               <a:rPr lang="ko-KR" altLang="en-US" smtClean="0"/>
-              <a:t>2023-06-19</a:t>
+              <a:t>2023-06-20</a:t>
             </a:fld>
             <a:endParaRPr lang="ko-KR" altLang="en-US"/>
           </a:p>
@@ -1009,7 +1009,7 @@
           <a:p>
             <a:fld id="{8C1837D2-6ADD-45AA-8DF7-A2610B22EAD7}" type="datetimeFigureOut">
               <a:rPr lang="ko-KR" altLang="en-US" smtClean="0"/>
-              <a:t>2023-06-19</a:t>
+              <a:t>2023-06-20</a:t>
             </a:fld>
             <a:endParaRPr lang="ko-KR" altLang="en-US"/>
           </a:p>
@@ -1241,7 +1241,7 @@
           <a:p>
             <a:fld id="{8C1837D2-6ADD-45AA-8DF7-A2610B22EAD7}" type="datetimeFigureOut">
               <a:rPr lang="ko-KR" altLang="en-US" smtClean="0"/>
-              <a:t>2023-06-19</a:t>
+              <a:t>2023-06-20</a:t>
             </a:fld>
             <a:endParaRPr lang="ko-KR" altLang="en-US"/>
           </a:p>
@@ -1608,7 +1608,7 @@
           <a:p>
             <a:fld id="{8C1837D2-6ADD-45AA-8DF7-A2610B22EAD7}" type="datetimeFigureOut">
               <a:rPr lang="ko-KR" altLang="en-US" smtClean="0"/>
-              <a:t>2023-06-19</a:t>
+              <a:t>2023-06-20</a:t>
             </a:fld>
             <a:endParaRPr lang="ko-KR" altLang="en-US"/>
           </a:p>
@@ -1726,7 +1726,7 @@
           <a:p>
             <a:fld id="{8C1837D2-6ADD-45AA-8DF7-A2610B22EAD7}" type="datetimeFigureOut">
               <a:rPr lang="ko-KR" altLang="en-US" smtClean="0"/>
-              <a:t>2023-06-19</a:t>
+              <a:t>2023-06-20</a:t>
             </a:fld>
             <a:endParaRPr lang="ko-KR" altLang="en-US"/>
           </a:p>
@@ -1821,7 +1821,7 @@
           <a:p>
             <a:fld id="{8C1837D2-6ADD-45AA-8DF7-A2610B22EAD7}" type="datetimeFigureOut">
               <a:rPr lang="ko-KR" altLang="en-US" smtClean="0"/>
-              <a:t>2023-06-19</a:t>
+              <a:t>2023-06-20</a:t>
             </a:fld>
             <a:endParaRPr lang="ko-KR" altLang="en-US"/>
           </a:p>
@@ -2098,7 +2098,7 @@
           <a:p>
             <a:fld id="{8C1837D2-6ADD-45AA-8DF7-A2610B22EAD7}" type="datetimeFigureOut">
               <a:rPr lang="ko-KR" altLang="en-US" smtClean="0"/>
-              <a:t>2023-06-19</a:t>
+              <a:t>2023-06-20</a:t>
             </a:fld>
             <a:endParaRPr lang="ko-KR" altLang="en-US"/>
           </a:p>
@@ -2351,7 +2351,7 @@
           <a:p>
             <a:fld id="{8C1837D2-6ADD-45AA-8DF7-A2610B22EAD7}" type="datetimeFigureOut">
               <a:rPr lang="ko-KR" altLang="en-US" smtClean="0"/>
-              <a:t>2023-06-19</a:t>
+              <a:t>2023-06-20</a:t>
             </a:fld>
             <a:endParaRPr lang="ko-KR" altLang="en-US"/>
           </a:p>
@@ -2564,7 +2564,7 @@
           <a:p>
             <a:fld id="{8C1837D2-6ADD-45AA-8DF7-A2610B22EAD7}" type="datetimeFigureOut">
               <a:rPr lang="ko-KR" altLang="en-US" smtClean="0"/>
-              <a:t>2023-06-19</a:t>
+              <a:t>2023-06-20</a:t>
             </a:fld>
             <a:endParaRPr lang="ko-KR" altLang="en-US"/>
           </a:p>
@@ -3716,6 +3716,13 @@
   <p:clrMapOvr>
     <a:masterClrMapping/>
   </p:clrMapOvr>
+  <p:timing>
+    <p:tnLst>
+      <p:par>
+        <p:cTn id="1" dur="indefinite" restart="never" nodeType="tmRoot"/>
+      </p:par>
+    </p:tnLst>
+  </p:timing>
 </p:sld>
 </file>
 

</xml_diff>